<commit_message>
Week1-1 Getting Started with Python Machine Learning
</commit_message>
<xml_diff>
--- a/Week1-1 Getting Started with Python Machine Learning.pptx
+++ b/Week1-1 Getting Started with Python Machine Learning.pptx
@@ -5,7 +5,7 @@
     <p:sldMasterId id="2147483648" r:id="rId1"/>
   </p:sldMasterIdLst>
   <p:notesMasterIdLst>
-    <p:notesMasterId r:id="rId13"/>
+    <p:notesMasterId r:id="rId14"/>
   </p:notesMasterIdLst>
   <p:sldIdLst>
     <p:sldId id="256" r:id="rId2"/>
@@ -19,6 +19,7 @@
     <p:sldId id="277" r:id="rId10"/>
     <p:sldId id="278" r:id="rId11"/>
     <p:sldId id="279" r:id="rId12"/>
+    <p:sldId id="280" r:id="rId13"/>
   </p:sldIdLst>
   <p:sldSz cx="9144000" cy="6858000" type="screen4x3"/>
   <p:notesSz cx="6858000" cy="9144000"/>
@@ -218,7 +219,7 @@
           <a:p>
             <a:fld id="{A7334436-B583-4C13-90AE-3AC62AE9B0EB}" type="datetimeFigureOut">
               <a:rPr lang="ko-KR" altLang="en-US" smtClean="0"/>
-              <a:t>2016-05-24</a:t>
+              <a:t>2016-05-27</a:t>
             </a:fld>
             <a:endParaRPr lang="ko-KR" altLang="en-US" dirty="0"/>
           </a:p>
@@ -790,7 +791,7 @@
           <a:p>
             <a:fld id="{FB30EDBD-1C2D-4C1E-B459-B60219FAB484}" type="datetimeFigureOut">
               <a:rPr lang="ko-KR" altLang="en-US" smtClean="0"/>
-              <a:t>2016-05-24</a:t>
+              <a:t>2016-05-27</a:t>
             </a:fld>
             <a:endParaRPr lang="ko-KR" altLang="en-US" dirty="0"/>
           </a:p>
@@ -955,7 +956,7 @@
           <a:p>
             <a:fld id="{FB30EDBD-1C2D-4C1E-B459-B60219FAB484}" type="datetimeFigureOut">
               <a:rPr lang="ko-KR" altLang="en-US" smtClean="0"/>
-              <a:t>2016-05-24</a:t>
+              <a:t>2016-05-27</a:t>
             </a:fld>
             <a:endParaRPr lang="ko-KR" altLang="en-US" dirty="0"/>
           </a:p>
@@ -1130,7 +1131,7 @@
           <a:p>
             <a:fld id="{FB30EDBD-1C2D-4C1E-B459-B60219FAB484}" type="datetimeFigureOut">
               <a:rPr lang="ko-KR" altLang="en-US" smtClean="0"/>
-              <a:t>2016-05-24</a:t>
+              <a:t>2016-05-27</a:t>
             </a:fld>
             <a:endParaRPr lang="ko-KR" altLang="en-US" dirty="0"/>
           </a:p>
@@ -1295,7 +1296,7 @@
           <a:p>
             <a:fld id="{FB30EDBD-1C2D-4C1E-B459-B60219FAB484}" type="datetimeFigureOut">
               <a:rPr lang="ko-KR" altLang="en-US" smtClean="0"/>
-              <a:t>2016-05-24</a:t>
+              <a:t>2016-05-27</a:t>
             </a:fld>
             <a:endParaRPr lang="ko-KR" altLang="en-US" dirty="0"/>
           </a:p>
@@ -1536,7 +1537,7 @@
           <a:p>
             <a:fld id="{FB30EDBD-1C2D-4C1E-B459-B60219FAB484}" type="datetimeFigureOut">
               <a:rPr lang="ko-KR" altLang="en-US" smtClean="0"/>
-              <a:t>2016-05-24</a:t>
+              <a:t>2016-05-27</a:t>
             </a:fld>
             <a:endParaRPr lang="ko-KR" altLang="en-US" dirty="0"/>
           </a:p>
@@ -1819,7 +1820,7 @@
           <a:p>
             <a:fld id="{FB30EDBD-1C2D-4C1E-B459-B60219FAB484}" type="datetimeFigureOut">
               <a:rPr lang="ko-KR" altLang="en-US" smtClean="0"/>
-              <a:t>2016-05-24</a:t>
+              <a:t>2016-05-27</a:t>
             </a:fld>
             <a:endParaRPr lang="ko-KR" altLang="en-US" dirty="0"/>
           </a:p>
@@ -2236,7 +2237,7 @@
           <a:p>
             <a:fld id="{FB30EDBD-1C2D-4C1E-B459-B60219FAB484}" type="datetimeFigureOut">
               <a:rPr lang="ko-KR" altLang="en-US" smtClean="0"/>
-              <a:t>2016-05-24</a:t>
+              <a:t>2016-05-27</a:t>
             </a:fld>
             <a:endParaRPr lang="ko-KR" altLang="en-US" dirty="0"/>
           </a:p>
@@ -2349,7 +2350,7 @@
           <a:p>
             <a:fld id="{FB30EDBD-1C2D-4C1E-B459-B60219FAB484}" type="datetimeFigureOut">
               <a:rPr lang="ko-KR" altLang="en-US" smtClean="0"/>
-              <a:t>2016-05-24</a:t>
+              <a:t>2016-05-27</a:t>
             </a:fld>
             <a:endParaRPr lang="ko-KR" altLang="en-US" dirty="0"/>
           </a:p>
@@ -2439,7 +2440,7 @@
           <a:p>
             <a:fld id="{FB30EDBD-1C2D-4C1E-B459-B60219FAB484}" type="datetimeFigureOut">
               <a:rPr lang="ko-KR" altLang="en-US" smtClean="0"/>
-              <a:t>2016-05-24</a:t>
+              <a:t>2016-05-27</a:t>
             </a:fld>
             <a:endParaRPr lang="ko-KR" altLang="en-US" dirty="0"/>
           </a:p>
@@ -2711,7 +2712,7 @@
           <a:p>
             <a:fld id="{FB30EDBD-1C2D-4C1E-B459-B60219FAB484}" type="datetimeFigureOut">
               <a:rPr lang="ko-KR" altLang="en-US" smtClean="0"/>
-              <a:t>2016-05-24</a:t>
+              <a:t>2016-05-27</a:t>
             </a:fld>
             <a:endParaRPr lang="ko-KR" altLang="en-US" dirty="0"/>
           </a:p>
@@ -2959,7 +2960,7 @@
           <a:p>
             <a:fld id="{FB30EDBD-1C2D-4C1E-B459-B60219FAB484}" type="datetimeFigureOut">
               <a:rPr lang="ko-KR" altLang="en-US" smtClean="0"/>
-              <a:t>2016-05-24</a:t>
+              <a:t>2016-05-27</a:t>
             </a:fld>
             <a:endParaRPr lang="ko-KR" altLang="en-US" dirty="0"/>
           </a:p>
@@ -3167,7 +3168,7 @@
           <a:p>
             <a:fld id="{FB30EDBD-1C2D-4C1E-B459-B60219FAB484}" type="datetimeFigureOut">
               <a:rPr lang="ko-KR" altLang="en-US" smtClean="0"/>
-              <a:t>2016-05-24</a:t>
+              <a:t>2016-05-27</a:t>
             </a:fld>
             <a:endParaRPr lang="ko-KR" altLang="en-US"/>
           </a:p>
@@ -3549,8 +3550,8 @@
         </p:nvSpPr>
         <p:spPr>
           <a:xfrm>
-            <a:off x="685800" y="1238895"/>
-            <a:ext cx="7772400" cy="1470025"/>
+            <a:off x="251520" y="734839"/>
+            <a:ext cx="8640960" cy="1758057"/>
           </a:xfrm>
         </p:spPr>
         <p:txBody>
@@ -3560,13 +3561,13 @@
           <a:lstStyle/>
           <a:p>
             <a:r>
-              <a:rPr lang="en-US" altLang="ko-KR" sz="4500" dirty="0" smtClean="0">
+              <a:rPr lang="en-US" altLang="ko-KR" sz="5000" dirty="0" smtClean="0">
                 <a:latin typeface="Adobe Heiti Std R" pitchFamily="34" charset="-128"/>
                 <a:ea typeface="Adobe Heiti Std R" pitchFamily="34" charset="-128"/>
               </a:rPr>
               <a:t>Getting Started with Python Machine Learning</a:t>
             </a:r>
-            <a:endParaRPr lang="ko-KR" altLang="en-US" sz="4500" dirty="0">
+            <a:endParaRPr lang="ko-KR" altLang="en-US" sz="5000" dirty="0">
               <a:latin typeface="Adobe Heiti Std R" pitchFamily="34" charset="-128"/>
             </a:endParaRPr>
           </a:p>
@@ -3584,25 +3585,25 @@
         </p:nvSpPr>
         <p:spPr>
           <a:xfrm>
-            <a:off x="1371600" y="5013176"/>
+            <a:off x="1371600" y="4941168"/>
             <a:ext cx="6400800" cy="648072"/>
           </a:xfrm>
         </p:spPr>
         <p:txBody>
-          <a:bodyPr>
+          <a:bodyPr anchor="ctr">
             <a:normAutofit/>
           </a:bodyPr>
           <a:lstStyle/>
           <a:p>
             <a:r>
-              <a:rPr lang="en-US" altLang="ko-KR" sz="2500" b="1" dirty="0" smtClean="0">
+              <a:rPr lang="en-US" altLang="ko-KR" sz="3000" b="1" dirty="0" smtClean="0">
                 <a:solidFill>
                   <a:schemeClr val="tx1"/>
                 </a:solidFill>
               </a:rPr>
               <a:t>Jingu Sim</a:t>
             </a:r>
-            <a:endParaRPr lang="ko-KR" altLang="en-US" sz="2500" b="1" dirty="0">
+            <a:endParaRPr lang="ko-KR" altLang="en-US" sz="3000" b="1" dirty="0">
               <a:solidFill>
                 <a:schemeClr val="tx1"/>
               </a:solidFill>
@@ -4648,6 +4649,569 @@
       <p:bldP spid="11" grpId="0"/>
       <p:bldP spid="12" grpId="0"/>
       <p:bldP spid="13" grpId="0"/>
+    </p:bldLst>
+  </p:timing>
+</p:sld>
+</file>
+
+<file path=ppt/slides/slide12.xml><?xml version="1.0" encoding="utf-8"?>
+<p:sld xmlns:a="http://schemas.openxmlformats.org/drawingml/2006/main" xmlns:r="http://schemas.openxmlformats.org/officeDocument/2006/relationships" xmlns:p="http://schemas.openxmlformats.org/presentationml/2006/main">
+  <p:cSld>
+    <p:spTree>
+      <p:nvGrpSpPr>
+        <p:cNvPr id="1" name=""/>
+        <p:cNvGrpSpPr/>
+        <p:nvPr/>
+      </p:nvGrpSpPr>
+      <p:grpSpPr>
+        <a:xfrm>
+          <a:off x="0" y="0"/>
+          <a:ext cx="0" cy="0"/>
+          <a:chOff x="0" y="0"/>
+          <a:chExt cx="0" cy="0"/>
+        </a:xfrm>
+      </p:grpSpPr>
+      <p:sp>
+        <p:nvSpPr>
+          <p:cNvPr id="2" name="제목 1"/>
+          <p:cNvSpPr>
+            <a:spLocks noGrp="1"/>
+          </p:cNvSpPr>
+          <p:nvPr>
+            <p:ph type="title"/>
+          </p:nvPr>
+        </p:nvSpPr>
+        <p:spPr/>
+        <p:txBody>
+          <a:bodyPr/>
+          <a:lstStyle/>
+          <a:p>
+            <a:r>
+              <a:rPr lang="en-US" altLang="ko-KR" smtClean="0"/>
+              <a:t>Summary</a:t>
+            </a:r>
+            <a:endParaRPr lang="ko-KR" altLang="en-US" dirty="0"/>
+          </a:p>
+        </p:txBody>
+      </p:sp>
+      <p:sp>
+        <p:nvSpPr>
+          <p:cNvPr id="4" name="TextBox 3"/>
+          <p:cNvSpPr txBox="1"/>
+          <p:nvPr/>
+        </p:nvSpPr>
+        <p:spPr>
+          <a:xfrm>
+            <a:off x="539552" y="1556792"/>
+            <a:ext cx="8147248" cy="461665"/>
+          </a:xfrm>
+          <a:prstGeom prst="rect">
+            <a:avLst/>
+          </a:prstGeom>
+          <a:noFill/>
+        </p:spPr>
+        <p:txBody>
+          <a:bodyPr wrap="square" rtlCol="0">
+            <a:spAutoFit/>
+          </a:bodyPr>
+          <a:lstStyle/>
+          <a:p>
+            <a:r>
+              <a:rPr lang="en-US" altLang="ko-KR" sz="2400" smtClean="0"/>
+              <a:t>Understanding </a:t>
+            </a:r>
+            <a:r>
+              <a:rPr lang="en-US" altLang="ko-KR" sz="2400"/>
+              <a:t>and refining </a:t>
+            </a:r>
+            <a:r>
+              <a:rPr lang="en-US" altLang="ko-KR" sz="2400"/>
+              <a:t>the </a:t>
+            </a:r>
+            <a:r>
+              <a:rPr lang="en-US" altLang="ko-KR" sz="2400" smtClean="0"/>
+              <a:t>data</a:t>
+            </a:r>
+            <a:endParaRPr lang="ko-KR" altLang="en-US" sz="2400" dirty="0" smtClean="0">
+              <a:latin typeface="+mn-ea"/>
+            </a:endParaRPr>
+          </a:p>
+        </p:txBody>
+      </p:sp>
+      <p:sp>
+        <p:nvSpPr>
+          <p:cNvPr id="5" name="TextBox 4"/>
+          <p:cNvSpPr txBox="1"/>
+          <p:nvPr/>
+        </p:nvSpPr>
+        <p:spPr>
+          <a:xfrm>
+            <a:off x="539552" y="3144596"/>
+            <a:ext cx="8147248" cy="461665"/>
+          </a:xfrm>
+          <a:prstGeom prst="rect">
+            <a:avLst/>
+          </a:prstGeom>
+          <a:noFill/>
+        </p:spPr>
+        <p:txBody>
+          <a:bodyPr wrap="square" rtlCol="0">
+            <a:spAutoFit/>
+          </a:bodyPr>
+          <a:lstStyle/>
+          <a:p>
+            <a:r>
+              <a:rPr lang="en-US" altLang="ko-KR" sz="2400" smtClean="0"/>
+              <a:t>The correct </a:t>
+            </a:r>
+            <a:r>
+              <a:rPr lang="en-US" altLang="ko-KR" sz="2400"/>
+              <a:t>experiment </a:t>
+            </a:r>
+            <a:r>
+              <a:rPr lang="en-US" altLang="ko-KR" sz="2400" smtClean="0"/>
+              <a:t>setup</a:t>
+            </a:r>
+            <a:endParaRPr lang="ko-KR" altLang="en-US" sz="2400" dirty="0" smtClean="0">
+              <a:latin typeface="+mn-ea"/>
+            </a:endParaRPr>
+          </a:p>
+        </p:txBody>
+      </p:sp>
+      <p:sp>
+        <p:nvSpPr>
+          <p:cNvPr id="6" name="TextBox 5"/>
+          <p:cNvSpPr txBox="1"/>
+          <p:nvPr/>
+        </p:nvSpPr>
+        <p:spPr>
+          <a:xfrm>
+            <a:off x="539552" y="2350694"/>
+            <a:ext cx="8147248" cy="461665"/>
+          </a:xfrm>
+          <a:prstGeom prst="rect">
+            <a:avLst/>
+          </a:prstGeom>
+          <a:noFill/>
+        </p:spPr>
+        <p:txBody>
+          <a:bodyPr wrap="square" rtlCol="0">
+            <a:spAutoFit/>
+          </a:bodyPr>
+          <a:lstStyle/>
+          <a:p>
+            <a:r>
+              <a:rPr lang="en-US" altLang="ko-KR" sz="2400" smtClean="0">
+                <a:latin typeface="+mn-ea"/>
+              </a:rPr>
+              <a:t>Switching </a:t>
+            </a:r>
+            <a:r>
+              <a:rPr lang="en-US" altLang="ko-KR" sz="2400">
+                <a:latin typeface="+mn-ea"/>
+              </a:rPr>
+              <a:t>your mental focus from algorithms to data</a:t>
+            </a:r>
+            <a:endParaRPr lang="ko-KR" altLang="en-US" sz="2400" dirty="0" smtClean="0">
+              <a:latin typeface="+mn-ea"/>
+            </a:endParaRPr>
+          </a:p>
+        </p:txBody>
+      </p:sp>
+      <p:sp>
+        <p:nvSpPr>
+          <p:cNvPr id="7" name="TextBox 6"/>
+          <p:cNvSpPr txBox="1"/>
+          <p:nvPr/>
+        </p:nvSpPr>
+        <p:spPr>
+          <a:xfrm>
+            <a:off x="539552" y="3938498"/>
+            <a:ext cx="8147248" cy="830997"/>
+          </a:xfrm>
+          <a:prstGeom prst="rect">
+            <a:avLst/>
+          </a:prstGeom>
+          <a:noFill/>
+        </p:spPr>
+        <p:txBody>
+          <a:bodyPr wrap="square" rtlCol="0">
+            <a:spAutoFit/>
+          </a:bodyPr>
+          <a:lstStyle/>
+          <a:p>
+            <a:r>
+              <a:rPr lang="en-US" altLang="ko-KR" sz="2400"/>
+              <a:t>The use of polynomial fitting is not the coolest </a:t>
+            </a:r>
+            <a:r>
+              <a:rPr lang="en-US" altLang="ko-KR" sz="2400"/>
+              <a:t>thing </a:t>
+            </a:r>
+            <a:r>
+              <a:rPr lang="en-US" altLang="ko-KR" sz="2400" smtClean="0"/>
+              <a:t>in </a:t>
+            </a:r>
+            <a:r>
+              <a:rPr lang="en-US" altLang="ko-KR" sz="2400"/>
+              <a:t>the </a:t>
+            </a:r>
+            <a:r>
+              <a:rPr lang="en-US" altLang="ko-KR" sz="2400" smtClean="0"/>
+              <a:t>machine learning </a:t>
+            </a:r>
+            <a:r>
+              <a:rPr lang="en-US" altLang="ko-KR" sz="2400"/>
+              <a:t>world</a:t>
+            </a:r>
+            <a:endParaRPr lang="ko-KR" altLang="en-US" sz="2400" dirty="0" smtClean="0">
+              <a:latin typeface="+mn-ea"/>
+            </a:endParaRPr>
+          </a:p>
+        </p:txBody>
+      </p:sp>
+      <p:sp>
+        <p:nvSpPr>
+          <p:cNvPr id="9" name="TextBox 8"/>
+          <p:cNvSpPr txBox="1"/>
+          <p:nvPr/>
+        </p:nvSpPr>
+        <p:spPr>
+          <a:xfrm>
+            <a:off x="539552" y="5101733"/>
+            <a:ext cx="8147248" cy="830997"/>
+          </a:xfrm>
+          <a:prstGeom prst="rect">
+            <a:avLst/>
+          </a:prstGeom>
+          <a:noFill/>
+        </p:spPr>
+        <p:txBody>
+          <a:bodyPr wrap="square" rtlCol="0">
+            <a:spAutoFit/>
+          </a:bodyPr>
+          <a:lstStyle/>
+          <a:p>
+            <a:r>
+              <a:rPr lang="en-US" altLang="ko-KR" sz="2400"/>
+              <a:t>We have chosen it to not distract you by the coolness of some shiny algorithm</a:t>
+            </a:r>
+            <a:endParaRPr lang="ko-KR" altLang="en-US" sz="2400" dirty="0" smtClean="0">
+              <a:latin typeface="+mn-ea"/>
+            </a:endParaRPr>
+          </a:p>
+        </p:txBody>
+      </p:sp>
+    </p:spTree>
+    <p:extLst>
+      <p:ext uri="{BB962C8B-B14F-4D97-AF65-F5344CB8AC3E}">
+        <p14:creationId xmlns:p14="http://schemas.microsoft.com/office/powerpoint/2010/main" val="1762387651"/>
+      </p:ext>
+    </p:extLst>
+  </p:cSld>
+  <p:clrMapOvr>
+    <a:masterClrMapping/>
+  </p:clrMapOvr>
+  <p:timing>
+    <p:tnLst>
+      <p:par>
+        <p:cTn id="1" dur="indefinite" restart="never" nodeType="tmRoot">
+          <p:childTnLst>
+            <p:seq concurrent="1" nextAc="seek">
+              <p:cTn id="2" dur="indefinite" nodeType="mainSeq">
+                <p:childTnLst>
+                  <p:par>
+                    <p:cTn id="3" fill="hold">
+                      <p:stCondLst>
+                        <p:cond delay="indefinite"/>
+                      </p:stCondLst>
+                      <p:childTnLst>
+                        <p:par>
+                          <p:cTn id="4" fill="hold">
+                            <p:stCondLst>
+                              <p:cond delay="0"/>
+                            </p:stCondLst>
+                            <p:childTnLst>
+                              <p:par>
+                                <p:cTn id="5" presetID="10" presetClass="entr" presetSubtype="0" fill="hold" grpId="0" nodeType="clickEffect">
+                                  <p:stCondLst>
+                                    <p:cond delay="0"/>
+                                  </p:stCondLst>
+                                  <p:childTnLst>
+                                    <p:set>
+                                      <p:cBhvr>
+                                        <p:cTn id="6" dur="1" fill="hold">
+                                          <p:stCondLst>
+                                            <p:cond delay="0"/>
+                                          </p:stCondLst>
+                                        </p:cTn>
+                                        <p:tgtEl>
+                                          <p:spTgt spid="4"/>
+                                        </p:tgtEl>
+                                        <p:attrNameLst>
+                                          <p:attrName>style.visibility</p:attrName>
+                                        </p:attrNameLst>
+                                      </p:cBhvr>
+                                      <p:to>
+                                        <p:strVal val="visible"/>
+                                      </p:to>
+                                    </p:set>
+                                    <p:animEffect transition="in" filter="fade">
+                                      <p:cBhvr>
+                                        <p:cTn id="7" dur="500"/>
+                                        <p:tgtEl>
+                                          <p:spTgt spid="4"/>
+                                        </p:tgtEl>
+                                      </p:cBhvr>
+                                    </p:animEffect>
+                                  </p:childTnLst>
+                                </p:cTn>
+                              </p:par>
+                            </p:childTnLst>
+                          </p:cTn>
+                        </p:par>
+                      </p:childTnLst>
+                    </p:cTn>
+                  </p:par>
+                  <p:par>
+                    <p:cTn id="8" fill="hold">
+                      <p:stCondLst>
+                        <p:cond delay="indefinite"/>
+                      </p:stCondLst>
+                      <p:childTnLst>
+                        <p:par>
+                          <p:cTn id="9" fill="hold">
+                            <p:stCondLst>
+                              <p:cond delay="0"/>
+                            </p:stCondLst>
+                            <p:childTnLst>
+                              <p:par>
+                                <p:cTn id="10" presetID="10" presetClass="entr" presetSubtype="0" fill="hold" grpId="0" nodeType="clickEffect">
+                                  <p:stCondLst>
+                                    <p:cond delay="0"/>
+                                  </p:stCondLst>
+                                  <p:childTnLst>
+                                    <p:set>
+                                      <p:cBhvr>
+                                        <p:cTn id="11" dur="1" fill="hold">
+                                          <p:stCondLst>
+                                            <p:cond delay="0"/>
+                                          </p:stCondLst>
+                                        </p:cTn>
+                                        <p:tgtEl>
+                                          <p:spTgt spid="5"/>
+                                        </p:tgtEl>
+                                        <p:attrNameLst>
+                                          <p:attrName>style.visibility</p:attrName>
+                                        </p:attrNameLst>
+                                      </p:cBhvr>
+                                      <p:to>
+                                        <p:strVal val="visible"/>
+                                      </p:to>
+                                    </p:set>
+                                    <p:animEffect transition="in" filter="fade">
+                                      <p:cBhvr>
+                                        <p:cTn id="12" dur="500"/>
+                                        <p:tgtEl>
+                                          <p:spTgt spid="5"/>
+                                        </p:tgtEl>
+                                      </p:cBhvr>
+                                    </p:animEffect>
+                                  </p:childTnLst>
+                                </p:cTn>
+                              </p:par>
+                            </p:childTnLst>
+                          </p:cTn>
+                        </p:par>
+                      </p:childTnLst>
+                    </p:cTn>
+                  </p:par>
+                  <p:par>
+                    <p:cTn id="13" fill="hold">
+                      <p:stCondLst>
+                        <p:cond delay="indefinite"/>
+                      </p:stCondLst>
+                      <p:childTnLst>
+                        <p:par>
+                          <p:cTn id="14" fill="hold">
+                            <p:stCondLst>
+                              <p:cond delay="0"/>
+                            </p:stCondLst>
+                            <p:childTnLst>
+                              <p:par>
+                                <p:cTn id="15" presetID="10" presetClass="entr" presetSubtype="0" fill="hold" grpId="0" nodeType="clickEffect">
+                                  <p:stCondLst>
+                                    <p:cond delay="0"/>
+                                  </p:stCondLst>
+                                  <p:childTnLst>
+                                    <p:set>
+                                      <p:cBhvr>
+                                        <p:cTn id="16" dur="1" fill="hold">
+                                          <p:stCondLst>
+                                            <p:cond delay="0"/>
+                                          </p:stCondLst>
+                                        </p:cTn>
+                                        <p:tgtEl>
+                                          <p:spTgt spid="6"/>
+                                        </p:tgtEl>
+                                        <p:attrNameLst>
+                                          <p:attrName>style.visibility</p:attrName>
+                                        </p:attrNameLst>
+                                      </p:cBhvr>
+                                      <p:to>
+                                        <p:strVal val="visible"/>
+                                      </p:to>
+                                    </p:set>
+                                    <p:animEffect transition="in" filter="fade">
+                                      <p:cBhvr>
+                                        <p:cTn id="17" dur="500"/>
+                                        <p:tgtEl>
+                                          <p:spTgt spid="6"/>
+                                        </p:tgtEl>
+                                      </p:cBhvr>
+                                    </p:animEffect>
+                                  </p:childTnLst>
+                                </p:cTn>
+                              </p:par>
+                            </p:childTnLst>
+                          </p:cTn>
+                        </p:par>
+                      </p:childTnLst>
+                    </p:cTn>
+                  </p:par>
+                  <p:par>
+                    <p:cTn id="18" fill="hold">
+                      <p:stCondLst>
+                        <p:cond delay="indefinite"/>
+                      </p:stCondLst>
+                      <p:childTnLst>
+                        <p:par>
+                          <p:cTn id="19" fill="hold">
+                            <p:stCondLst>
+                              <p:cond delay="0"/>
+                            </p:stCondLst>
+                            <p:childTnLst>
+                              <p:par>
+                                <p:cTn id="20" presetID="10" presetClass="entr" presetSubtype="0" fill="hold" grpId="0" nodeType="clickEffect">
+                                  <p:stCondLst>
+                                    <p:cond delay="0"/>
+                                  </p:stCondLst>
+                                  <p:childTnLst>
+                                    <p:set>
+                                      <p:cBhvr>
+                                        <p:cTn id="21" dur="1" fill="hold">
+                                          <p:stCondLst>
+                                            <p:cond delay="0"/>
+                                          </p:stCondLst>
+                                        </p:cTn>
+                                        <p:tgtEl>
+                                          <p:spTgt spid="7"/>
+                                        </p:tgtEl>
+                                        <p:attrNameLst>
+                                          <p:attrName>style.visibility</p:attrName>
+                                        </p:attrNameLst>
+                                      </p:cBhvr>
+                                      <p:to>
+                                        <p:strVal val="visible"/>
+                                      </p:to>
+                                    </p:set>
+                                    <p:animEffect transition="in" filter="fade">
+                                      <p:cBhvr>
+                                        <p:cTn id="22" dur="500"/>
+                                        <p:tgtEl>
+                                          <p:spTgt spid="7"/>
+                                        </p:tgtEl>
+                                      </p:cBhvr>
+                                    </p:animEffect>
+                                  </p:childTnLst>
+                                </p:cTn>
+                              </p:par>
+                            </p:childTnLst>
+                          </p:cTn>
+                        </p:par>
+                      </p:childTnLst>
+                    </p:cTn>
+                  </p:par>
+                  <p:par>
+                    <p:cTn id="23" fill="hold">
+                      <p:stCondLst>
+                        <p:cond delay="indefinite"/>
+                      </p:stCondLst>
+                      <p:childTnLst>
+                        <p:par>
+                          <p:cTn id="24" fill="hold">
+                            <p:stCondLst>
+                              <p:cond delay="0"/>
+                            </p:stCondLst>
+                            <p:childTnLst>
+                              <p:par>
+                                <p:cTn id="25" presetID="10" presetClass="entr" presetSubtype="0" fill="hold" grpId="0" nodeType="clickEffect">
+                                  <p:stCondLst>
+                                    <p:cond delay="0"/>
+                                  </p:stCondLst>
+                                  <p:childTnLst>
+                                    <p:set>
+                                      <p:cBhvr>
+                                        <p:cTn id="26" dur="1" fill="hold">
+                                          <p:stCondLst>
+                                            <p:cond delay="0"/>
+                                          </p:stCondLst>
+                                        </p:cTn>
+                                        <p:tgtEl>
+                                          <p:spTgt spid="9"/>
+                                        </p:tgtEl>
+                                        <p:attrNameLst>
+                                          <p:attrName>style.visibility</p:attrName>
+                                        </p:attrNameLst>
+                                      </p:cBhvr>
+                                      <p:to>
+                                        <p:strVal val="visible"/>
+                                      </p:to>
+                                    </p:set>
+                                    <p:animEffect transition="in" filter="fade">
+                                      <p:cBhvr>
+                                        <p:cTn id="27" dur="500"/>
+                                        <p:tgtEl>
+                                          <p:spTgt spid="9"/>
+                                        </p:tgtEl>
+                                      </p:cBhvr>
+                                    </p:animEffect>
+                                  </p:childTnLst>
+                                </p:cTn>
+                              </p:par>
+                            </p:childTnLst>
+                          </p:cTn>
+                        </p:par>
+                      </p:childTnLst>
+                    </p:cTn>
+                  </p:par>
+                </p:childTnLst>
+              </p:cTn>
+              <p:prevCondLst>
+                <p:cond evt="onPrev" delay="0">
+                  <p:tgtEl>
+                    <p:sldTgt/>
+                  </p:tgtEl>
+                </p:cond>
+              </p:prevCondLst>
+              <p:nextCondLst>
+                <p:cond evt="onNext" delay="0">
+                  <p:tgtEl>
+                    <p:sldTgt/>
+                  </p:tgtEl>
+                </p:cond>
+              </p:nextCondLst>
+            </p:seq>
+          </p:childTnLst>
+        </p:cTn>
+      </p:par>
+    </p:tnLst>
+    <p:bldLst>
+      <p:bldP spid="4" grpId="0"/>
+      <p:bldP spid="5" grpId="0"/>
+      <p:bldP spid="6" grpId="0"/>
+      <p:bldP spid="7" grpId="0"/>
+      <p:bldP spid="9" grpId="0"/>
     </p:bldLst>
   </p:timing>
 </p:sld>
@@ -7376,13 +7940,7 @@
               <a:rPr lang="en-US" altLang="ko-KR" sz="2400" dirty="0" smtClean="0">
                 <a:latin typeface="+mn-ea"/>
               </a:rPr>
-              <a:t>(l</a:t>
-            </a:r>
-            <a:r>
-              <a:rPr lang="en-US" altLang="ko-KR" sz="2400" dirty="0" smtClean="0">
-                <a:latin typeface="+mn-ea"/>
-              </a:rPr>
-              <a:t>inear algebra)</a:t>
+              <a:t>(linear algebra)</a:t>
             </a:r>
           </a:p>
           <a:p>
@@ -7450,13 +8008,7 @@
               <a:rPr lang="en-US" altLang="ko-KR" sz="2400" dirty="0" smtClean="0">
                 <a:latin typeface="+mn-ea"/>
               </a:rPr>
-              <a:t>(fast Fourier transfor</a:t>
-            </a:r>
-            <a:r>
-              <a:rPr lang="en-US" altLang="ko-KR" sz="2400" dirty="0" smtClean="0">
-                <a:latin typeface="+mn-ea"/>
-              </a:rPr>
-              <a:t>m)</a:t>
+              <a:t>(fast Fourier transform)</a:t>
             </a:r>
           </a:p>
         </p:txBody>
@@ -8261,11 +8813,7 @@
                       <a:pPr latinLnBrk="1"/>
                       <a:r>
                         <a:rPr lang="ko-KR" altLang="en-US" sz="1200" dirty="0" smtClean="0"/>
-                        <a:t>공간 </a:t>
-                      </a:r>
-                      <a:r>
-                        <a:rPr lang="ko-KR" altLang="en-US" sz="1200" dirty="0" smtClean="0"/>
-                        <a:t>데이터 및 알고리즘</a:t>
+                        <a:t>공간 데이터 및 알고리즘</a:t>
                       </a:r>
                       <a:endParaRPr lang="ko-KR" altLang="en-US" sz="1200" dirty="0"/>
                     </a:p>

</xml_diff>